<commit_message>
Update the docs about images
</commit_message>
<xml_diff>
--- a/docs/images_of_spec.pptx
+++ b/docs/images_of_spec.pptx
@@ -4473,8 +4473,8 @@
           <a:lstStyle/>
           <a:p>
             <a:r>
-              <a:rPr lang="en-US" dirty="0" smtClean="0"/>
-              <a:t>Example 1</a:t>
+              <a:rPr lang="en-US" smtClean="0"/>
+              <a:t>Introduction</a:t>
             </a:r>
             <a:endParaRPr lang="en-US" dirty="0"/>
           </a:p>
@@ -6489,7 +6489,7 @@
           <a:p>
             <a:r>
               <a:rPr lang="en-US" dirty="0" smtClean="0"/>
-              <a:t>Example 2</a:t>
+              <a:t>Overview</a:t>
             </a:r>
             <a:endParaRPr lang="en-US" dirty="0"/>
           </a:p>

</xml_diff>

<commit_message>
Fix a minor error
</commit_message>
<xml_diff>
--- a/docs/images_of_spec.pptx
+++ b/docs/images_of_spec.pptx
@@ -7933,7 +7933,7 @@
           </p:nvSpPr>
           <p:spPr>
             <a:xfrm>
-              <a:off x="1514884" y="851411"/>
+              <a:off x="1484404" y="841251"/>
               <a:ext cx="4368892" cy="584775"/>
             </a:xfrm>
             <a:prstGeom prst="rect">
@@ -7955,7 +7955,27 @@
                   <a:latin typeface="Roboto" panose="02000000000000000000" pitchFamily="2" charset="0"/>
                   <a:ea typeface="Roboto" panose="02000000000000000000" pitchFamily="2" charset="0"/>
                 </a:rPr>
-                <a:t>1. Press the arrow down key on a focused</a:t>
+                <a:t>1. Press the arrow </a:t>
+              </a:r>
+              <a:r>
+                <a:rPr lang="en-US" sz="1600" dirty="0" smtClean="0">
+                  <a:solidFill>
+                    <a:srgbClr val="C00000"/>
+                  </a:solidFill>
+                  <a:latin typeface="Roboto" panose="02000000000000000000" pitchFamily="2" charset="0"/>
+                  <a:ea typeface="Roboto" panose="02000000000000000000" pitchFamily="2" charset="0"/>
+                </a:rPr>
+                <a:t>right key </a:t>
+              </a:r>
+              <a:r>
+                <a:rPr lang="en-US" sz="1600" dirty="0" smtClean="0">
+                  <a:solidFill>
+                    <a:srgbClr val="C00000"/>
+                  </a:solidFill>
+                  <a:latin typeface="Roboto" panose="02000000000000000000" pitchFamily="2" charset="0"/>
+                  <a:ea typeface="Roboto" panose="02000000000000000000" pitchFamily="2" charset="0"/>
+                </a:rPr>
+                <a:t>on a focused</a:t>
               </a:r>
             </a:p>
             <a:p>
@@ -8040,7 +8060,7 @@
           </p:nvSpPr>
           <p:spPr>
             <a:xfrm>
-              <a:off x="6336194" y="857139"/>
+              <a:off x="6305714" y="846979"/>
               <a:ext cx="3977082" cy="338554"/>
             </a:xfrm>
             <a:prstGeom prst="rect">
@@ -8118,7 +8138,7 @@
           </p:nvSpPr>
           <p:spPr>
             <a:xfrm>
-              <a:off x="1514884" y="3992507"/>
+              <a:off x="1484404" y="3982347"/>
               <a:ext cx="4243659" cy="338554"/>
             </a:xfrm>
             <a:prstGeom prst="rect">
@@ -8203,7 +8223,7 @@
           </p:nvSpPr>
           <p:spPr>
             <a:xfrm>
-              <a:off x="6340500" y="3918018"/>
+              <a:off x="6310020" y="3907858"/>
               <a:ext cx="3977082" cy="338554"/>
             </a:xfrm>
             <a:prstGeom prst="rect">

</xml_diff>